<commit_message>
Update golangprojects to include pdf
</commit_message>
<xml_diff>
--- a/golangprojects.pptx
+++ b/golangprojects.pptx
@@ -117,6 +117,11 @@
       </a:defRPr>
     </a:lvl9pPr>
   </p:defaultTextStyle>
+  <p:extLst>
+    <p:ext uri="{EFAFB233-063F-42B5-8137-9DF3F51BA10A}">
+      <p15:sldGuideLst xmlns:p15="http://schemas.microsoft.com/office/powerpoint/2012/main"/>
+    </p:ext>
+  </p:extLst>
 </p:presentation>
 </file>
 
@@ -267,7 +272,7 @@
           <a:p>
             <a:fld id="{76969C88-B244-455D-A017-012B25B1ACDD}" type="datetimeFigureOut">
               <a:rPr lang="en-US" smtClean="0"/>
-              <a:t>8/28/20</a:t>
+              <a:t>7/1/24</a:t>
             </a:fld>
             <a:endParaRPr lang="en-US"/>
           </a:p>
@@ -465,7 +470,7 @@
           <a:p>
             <a:fld id="{76969C88-B244-455D-A017-012B25B1ACDD}" type="datetimeFigureOut">
               <a:rPr lang="en-US" smtClean="0"/>
-              <a:t>8/28/20</a:t>
+              <a:t>7/1/24</a:t>
             </a:fld>
             <a:endParaRPr lang="en-US"/>
           </a:p>
@@ -673,7 +678,7 @@
           <a:p>
             <a:fld id="{76969C88-B244-455D-A017-012B25B1ACDD}" type="datetimeFigureOut">
               <a:rPr lang="en-US" smtClean="0"/>
-              <a:t>8/28/20</a:t>
+              <a:t>7/1/24</a:t>
             </a:fld>
             <a:endParaRPr lang="en-US"/>
           </a:p>
@@ -872,7 +877,7 @@
           <a:p>
             <a:fld id="{76969C88-B244-455D-A017-012B25B1ACDD}" type="datetimeFigureOut">
               <a:rPr lang="en-US" smtClean="0"/>
-              <a:t>8/28/20</a:t>
+              <a:t>7/1/24</a:t>
             </a:fld>
             <a:endParaRPr lang="en-US"/>
           </a:p>
@@ -1147,7 +1152,7 @@
           <a:p>
             <a:fld id="{76969C88-B244-455D-A017-012B25B1ACDD}" type="datetimeFigureOut">
               <a:rPr lang="en-US" smtClean="0"/>
-              <a:t>8/28/20</a:t>
+              <a:t>7/1/24</a:t>
             </a:fld>
             <a:endParaRPr lang="en-US"/>
           </a:p>
@@ -1412,7 +1417,7 @@
           <a:p>
             <a:fld id="{76969C88-B244-455D-A017-012B25B1ACDD}" type="datetimeFigureOut">
               <a:rPr lang="en-US" smtClean="0"/>
-              <a:t>8/28/20</a:t>
+              <a:t>7/1/24</a:t>
             </a:fld>
             <a:endParaRPr lang="en-US"/>
           </a:p>
@@ -1824,7 +1829,7 @@
           <a:p>
             <a:fld id="{76969C88-B244-455D-A017-012B25B1ACDD}" type="datetimeFigureOut">
               <a:rPr lang="en-US" smtClean="0"/>
-              <a:t>8/28/20</a:t>
+              <a:t>7/1/24</a:t>
             </a:fld>
             <a:endParaRPr lang="en-US"/>
           </a:p>
@@ -1965,7 +1970,7 @@
           <a:p>
             <a:fld id="{76969C88-B244-455D-A017-012B25B1ACDD}" type="datetimeFigureOut">
               <a:rPr lang="en-US" smtClean="0"/>
-              <a:t>8/28/20</a:t>
+              <a:t>7/1/24</a:t>
             </a:fld>
             <a:endParaRPr lang="en-US"/>
           </a:p>
@@ -2078,7 +2083,7 @@
           <a:p>
             <a:fld id="{76969C88-B244-455D-A017-012B25B1ACDD}" type="datetimeFigureOut">
               <a:rPr lang="en-US" smtClean="0"/>
-              <a:t>8/28/20</a:t>
+              <a:t>7/1/24</a:t>
             </a:fld>
             <a:endParaRPr lang="en-US"/>
           </a:p>
@@ -2390,7 +2395,7 @@
           <a:p>
             <a:fld id="{76969C88-B244-455D-A017-012B25B1ACDD}" type="datetimeFigureOut">
               <a:rPr lang="en-US" smtClean="0"/>
-              <a:t>8/28/20</a:t>
+              <a:t>7/1/24</a:t>
             </a:fld>
             <a:endParaRPr lang="en-US"/>
           </a:p>
@@ -2681,7 +2686,7 @@
           <a:p>
             <a:fld id="{76969C88-B244-455D-A017-012B25B1ACDD}" type="datetimeFigureOut">
               <a:rPr lang="en-US" smtClean="0"/>
-              <a:t>8/28/20</a:t>
+              <a:t>7/1/24</a:t>
             </a:fld>
             <a:endParaRPr lang="en-US"/>
           </a:p>
@@ -3437,7 +3442,7 @@
             <a:fld id="{76969C88-B244-455D-A017-012B25B1ACDD}" type="datetimeFigureOut">
               <a:rPr lang="en-US" smtClean="0"/>
               <a:pPr/>
-              <a:t>8/28/20</a:t>
+              <a:t>7/1/24</a:t>
             </a:fld>
             <a:endParaRPr lang="en-US"/>
           </a:p>
@@ -4422,7 +4427,7 @@
             </a:pPr>
             <a:r>
               <a:rPr lang="en-US" sz="2200" dirty="0"/>
-              <a:t>August 28, 2020</a:t>
+              <a:t>July 1, 2024</a:t>
             </a:r>
           </a:p>
         </p:txBody>

</xml_diff>